<commit_message>
:writing_hand: Fixed the grammar mistakes in english in the poster as well. :ok_hand:
</commit_message>
<xml_diff>
--- a/Documents/POSTERI.pptx
+++ b/Documents/POSTERI.pptx
@@ -3452,7 +3452,7 @@
               <a:buNone/>
             </a:pPr>
             <a:r>
-              <a:rPr lang="fi-FI" sz="1200" dirty="0" err="1">
+              <a:rPr lang="fi-FI" sz="1200" dirty="0" err="1" smtClean="0">
                 <a:solidFill>
                   <a:srgbClr val="7F7F7F"/>
                 </a:solidFill>
@@ -3461,7 +3461,7 @@
                 <a:cs typeface="Arial Narrow"/>
                 <a:sym typeface="Arial Narrow"/>
               </a:rPr>
-              <a:t>Thesis</a:t>
+              <a:t>Coursework</a:t>
             </a:r>
             <a:endParaRPr lang="fi-FI" sz="1200" b="0" i="0" u="none" strike="noStrike" cap="none" dirty="0">
               <a:solidFill>
@@ -3508,7 +3508,7 @@
               <a:buNone/>
             </a:pPr>
             <a:r>
-              <a:rPr lang="fi-FI" sz="1200" b="0" i="0" u="none" strike="noStrike" cap="none" dirty="0" err="1">
+              <a:rPr lang="fi-FI" sz="1200" dirty="0" smtClean="0">
                 <a:solidFill>
                   <a:srgbClr val="7F7F7F"/>
                 </a:solidFill>
@@ -3517,10 +3517,10 @@
                 <a:cs typeface="Arial Narrow"/>
                 <a:sym typeface="Arial Narrow"/>
               </a:rPr>
-              <a:t>Date</a:t>
-            </a:r>
-            <a:r>
-              <a:rPr lang="fi-FI" sz="1200" b="0" i="0" u="none" strike="noStrike" cap="none" dirty="0">
+              <a:t>20.12.</a:t>
+            </a:r>
+            <a:r>
+              <a:rPr lang="fi-FI" sz="1200" b="0" i="0" u="none" strike="noStrike" cap="none" dirty="0" smtClean="0">
                 <a:solidFill>
                   <a:srgbClr val="7F7F7F"/>
                 </a:solidFill>
@@ -3529,34 +3529,10 @@
                 <a:cs typeface="Arial Narrow"/>
                 <a:sym typeface="Arial Narrow"/>
               </a:rPr>
-              <a:t> of </a:t>
-            </a:r>
-            <a:r>
-              <a:rPr lang="fi-FI" sz="1200" b="0" i="0" u="none" strike="noStrike" cap="none" dirty="0" err="1">
-                <a:solidFill>
-                  <a:srgbClr val="7F7F7F"/>
-                </a:solidFill>
-                <a:latin typeface="Arial Narrow"/>
-                <a:ea typeface="Arial Narrow"/>
-                <a:cs typeface="Arial Narrow"/>
-                <a:sym typeface="Arial Narrow"/>
-              </a:rPr>
-              <a:t>publication</a:t>
-            </a:r>
-            <a:r>
-              <a:rPr lang="fi-FI" sz="1200" b="0" i="0" u="none" strike="noStrike" cap="none" dirty="0">
-                <a:solidFill>
-                  <a:srgbClr val="7F7F7F"/>
-                </a:solidFill>
-                <a:latin typeface="Arial Narrow"/>
-                <a:ea typeface="Arial Narrow"/>
-                <a:cs typeface="Arial Narrow"/>
-                <a:sym typeface="Arial Narrow"/>
-              </a:rPr>
-              <a:t>: 201</a:t>
-            </a:r>
-            <a:r>
-              <a:rPr lang="fi-FI" sz="1200" dirty="0">
+              <a:t>201</a:t>
+            </a:r>
+            <a:r>
+              <a:rPr lang="fi-FI" sz="1200" dirty="0" smtClean="0">
                 <a:solidFill>
                   <a:srgbClr val="7F7F7F"/>
                 </a:solidFill>
@@ -3577,8 +3553,29 @@
                 <a:cs typeface="Arial Narrow"/>
                 <a:sym typeface="Arial Narrow"/>
               </a:rPr>
-              <a:t>, Summer</a:t>
-            </a:r>
+              <a:t>, </a:t>
+            </a:r>
+            <a:r>
+              <a:rPr lang="fi-FI" sz="1200" dirty="0" smtClean="0">
+                <a:solidFill>
+                  <a:srgbClr val="7F7F7F"/>
+                </a:solidFill>
+                <a:latin typeface="Arial Narrow"/>
+                <a:ea typeface="Arial Narrow"/>
+                <a:cs typeface="Arial Narrow"/>
+                <a:sym typeface="Arial Narrow"/>
+              </a:rPr>
+              <a:t>Winter</a:t>
+            </a:r>
+            <a:endParaRPr lang="fi-FI" sz="1200" b="0" i="0" u="none" strike="noStrike" cap="none" dirty="0">
+              <a:solidFill>
+                <a:srgbClr val="7F7F7F"/>
+              </a:solidFill>
+              <a:latin typeface="Arial Narrow"/>
+              <a:ea typeface="Arial Narrow"/>
+              <a:cs typeface="Arial Narrow"/>
+              <a:sym typeface="Arial Narrow"/>
+            </a:endParaRPr>
           </a:p>
         </p:txBody>
       </p:sp>
@@ -3984,7 +3981,39 @@
             </a:pPr>
             <a:r>
               <a:rPr lang="en-US" dirty="0" smtClean="0"/>
-              <a:t>The subject of this thesis was to design and develop 3D –video game for PC. Development we used Unity which is a cross-platform game engine developed by Unity Technologies. Our goal was to develop a racing video game.</a:t>
+              <a:t>The subject of this thesis was to design and </a:t>
+            </a:r>
+            <a:r>
+              <a:rPr lang="en-US" dirty="0" smtClean="0"/>
+              <a:t>develop a </a:t>
+            </a:r>
+            <a:r>
+              <a:rPr lang="en-US" dirty="0" smtClean="0"/>
+              <a:t>3D </a:t>
+            </a:r>
+            <a:r>
+              <a:rPr lang="en-US" dirty="0" smtClean="0"/>
+              <a:t>video </a:t>
+            </a:r>
+            <a:r>
+              <a:rPr lang="en-US" dirty="0" smtClean="0"/>
+              <a:t>game for PC. </a:t>
+            </a:r>
+            <a:r>
+              <a:rPr lang="en-US" dirty="0" smtClean="0"/>
+              <a:t>In the development </a:t>
+            </a:r>
+            <a:r>
+              <a:rPr lang="en-US" dirty="0" smtClean="0"/>
+              <a:t>we </a:t>
+            </a:r>
+            <a:r>
+              <a:rPr lang="en-US" dirty="0" smtClean="0"/>
+              <a:t>used the Unity game engine </a:t>
+            </a:r>
+            <a:r>
+              <a:rPr lang="en-US" dirty="0" smtClean="0"/>
+              <a:t>which is a cross-platform game engine developed by Unity Technologies. Our goal was to develop a racing video game.</a:t>
             </a:r>
           </a:p>
           <a:p>
@@ -4376,11 +4405,7 @@
             </a:r>
             <a:r>
               <a:rPr lang="fi-FI" b="1" dirty="0" smtClean="0"/>
-              <a:t> </a:t>
-            </a:r>
-            <a:r>
-              <a:rPr lang="fi-FI" b="1" dirty="0" smtClean="0"/>
-              <a:t> </a:t>
+              <a:t>  </a:t>
             </a:r>
           </a:p>
           <a:p>
@@ -4403,19 +4428,63 @@
             </a:pPr>
             <a:r>
               <a:rPr lang="en-US" dirty="0" smtClean="0"/>
-              <a:t>A </a:t>
+              <a:t>A 3D </a:t>
             </a:r>
             <a:r>
               <a:rPr lang="en-US" dirty="0" smtClean="0"/>
-              <a:t>3D –racing video game called </a:t>
+              <a:t>racing </a:t>
             </a:r>
             <a:r>
               <a:rPr lang="en-US" dirty="0" smtClean="0"/>
-              <a:t>Gunther the Game is </a:t>
+              <a:t>video game called Gunther the Game is a </a:t>
             </a:r>
             <a:r>
               <a:rPr lang="en-US" dirty="0" smtClean="0"/>
-              <a:t>a PC –video game for people who want to compete against their friends in online game. The purpose of the game is to collect points while driving. The winner is a player who gathers more points before death. There is enemies on the road who shoot you to death if you are too slow!</a:t>
+              <a:t>PC-</a:t>
+            </a:r>
+            <a:r>
+              <a:rPr lang="en-US" dirty="0" smtClean="0"/>
+              <a:t>video </a:t>
+            </a:r>
+            <a:r>
+              <a:rPr lang="en-US" dirty="0" smtClean="0"/>
+              <a:t>game for people who want to compete against their friends </a:t>
+            </a:r>
+            <a:r>
+              <a:rPr lang="en-US" dirty="0" smtClean="0"/>
+              <a:t>in an online </a:t>
+            </a:r>
+            <a:r>
+              <a:rPr lang="en-US" dirty="0" smtClean="0"/>
+              <a:t>game. The purpose of the game is to collect points while </a:t>
+            </a:r>
+            <a:r>
+              <a:rPr lang="en-US" dirty="0" smtClean="0"/>
+              <a:t>driving laps through the circuit. </a:t>
+            </a:r>
+            <a:r>
+              <a:rPr lang="en-US" dirty="0" smtClean="0"/>
+              <a:t>The winner is a player who </a:t>
+            </a:r>
+            <a:r>
+              <a:rPr lang="en-US" dirty="0" smtClean="0"/>
+              <a:t>finishes 5 laps before the others. </a:t>
+            </a:r>
+            <a:r>
+              <a:rPr lang="en-US" dirty="0" smtClean="0"/>
+              <a:t>There </a:t>
+            </a:r>
+            <a:r>
+              <a:rPr lang="en-US" dirty="0" smtClean="0"/>
+              <a:t>are</a:t>
+            </a:r>
+            <a:r>
+              <a:rPr lang="en-US" dirty="0" smtClean="0"/>
+              <a:t> </a:t>
+            </a:r>
+            <a:r>
+              <a:rPr lang="en-US" dirty="0" smtClean="0"/>
+              <a:t>enemies on the road who shoot you to death if you are too slow!</a:t>
             </a:r>
             <a:endParaRPr lang="fi-FI" dirty="0"/>
           </a:p>
@@ -4563,7 +4632,7 @@
                 <a:cs typeface="Arial Narrow"/>
                 <a:sym typeface="Arial Narrow"/>
               </a:rPr>
-              <a:t> </a:t>
+              <a:t> – a 3D </a:t>
             </a:r>
             <a:r>
               <a:rPr lang="fi-FI" sz="1500" b="0" i="0" u="none" strike="noStrike" cap="none" dirty="0" smtClean="0">
@@ -4575,7 +4644,7 @@
                 <a:cs typeface="Arial Narrow"/>
                 <a:sym typeface="Arial Narrow"/>
               </a:rPr>
-              <a:t>3D – racing video </a:t>
+              <a:t>racing video </a:t>
             </a:r>
             <a:r>
               <a:rPr lang="fi-FI" sz="1500" b="0" i="0" u="none" strike="noStrike" cap="none" dirty="0" err="1" smtClean="0">
@@ -4599,7 +4668,19 @@
                 <a:cs typeface="Arial Narrow"/>
                 <a:sym typeface="Arial Narrow"/>
               </a:rPr>
-              <a:t> for PC is </a:t>
+              <a:t> for </a:t>
+            </a:r>
+            <a:r>
+              <a:rPr lang="fi-FI" sz="1500" b="0" i="0" u="none" strike="noStrike" cap="none" dirty="0" smtClean="0">
+                <a:solidFill>
+                  <a:schemeClr val="dk1"/>
+                </a:solidFill>
+                <a:latin typeface="Arial Narrow"/>
+                <a:ea typeface="Arial Narrow"/>
+                <a:cs typeface="Arial Narrow"/>
+                <a:sym typeface="Arial Narrow"/>
+              </a:rPr>
+              <a:t>PC </a:t>
             </a:r>
             <a:r>
               <a:rPr lang="fi-FI" sz="1500" b="0" i="0" u="none" strike="noStrike" cap="none" dirty="0" err="1" smtClean="0">
@@ -4700,6 +4781,14 @@
             <a:r>
               <a:rPr lang="fi-FI" dirty="0" err="1" smtClean="0"/>
               <a:t>scripts</a:t>
+            </a:r>
+            <a:r>
+              <a:rPr lang="fi-FI" dirty="0" smtClean="0"/>
+              <a:t> </a:t>
+            </a:r>
+            <a:r>
+              <a:rPr lang="fi-FI" dirty="0" err="1" smtClean="0"/>
+              <a:t>which</a:t>
             </a:r>
             <a:r>
               <a:rPr lang="fi-FI" dirty="0" smtClean="0"/>
@@ -5454,6 +5543,30 @@
                 <a:cs typeface="Arial Narrow"/>
                 <a:sym typeface="Arial Narrow"/>
               </a:rPr>
+              <a:t>the</a:t>
+            </a:r>
+            <a:r>
+              <a:rPr lang="fi-FI" sz="1500" i="0" u="none" strike="noStrike" cap="none" dirty="0" smtClean="0">
+                <a:solidFill>
+                  <a:schemeClr val="dk1"/>
+                </a:solidFill>
+                <a:latin typeface="Arial Narrow"/>
+                <a:ea typeface="Arial Narrow"/>
+                <a:cs typeface="Arial Narrow"/>
+                <a:sym typeface="Arial Narrow"/>
+              </a:rPr>
+              <a:t> </a:t>
+            </a:r>
+            <a:r>
+              <a:rPr lang="fi-FI" sz="1500" i="0" u="none" strike="noStrike" cap="none" dirty="0" err="1" smtClean="0">
+                <a:solidFill>
+                  <a:schemeClr val="dk1"/>
+                </a:solidFill>
+                <a:latin typeface="Arial Narrow"/>
+                <a:ea typeface="Arial Narrow"/>
+                <a:cs typeface="Arial Narrow"/>
+                <a:sym typeface="Arial Narrow"/>
+              </a:rPr>
               <a:t>Unity</a:t>
             </a:r>
             <a:r>
@@ -5474,7 +5587,11 @@
             </a:r>
             <a:r>
               <a:rPr lang="fi-FI" dirty="0" smtClean="0"/>
-              <a:t> is </a:t>
+              <a:t> </a:t>
+            </a:r>
+            <a:r>
+              <a:rPr lang="fi-FI" dirty="0" smtClean="0"/>
+              <a:t>is a </a:t>
             </a:r>
             <a:r>
               <a:rPr lang="fi-FI" dirty="0" err="1" smtClean="0"/>
@@ -5522,7 +5639,7 @@
             </a:r>
             <a:r>
               <a:rPr lang="fi-FI" dirty="0" smtClean="0"/>
-              <a:t> </a:t>
+              <a:t> for </a:t>
             </a:r>
             <a:r>
               <a:rPr lang="fi-FI" dirty="0" err="1" smtClean="0"/>
@@ -5538,7 +5655,11 @@
             </a:r>
             <a:r>
               <a:rPr lang="fi-FI" dirty="0" smtClean="0"/>
-              <a:t> us </a:t>
+              <a:t> </a:t>
+            </a:r>
+            <a:r>
+              <a:rPr lang="fi-FI" dirty="0" smtClean="0"/>
+              <a:t>us, </a:t>
             </a:r>
             <a:r>
               <a:rPr lang="fi-FI" dirty="0" err="1" smtClean="0"/>
@@ -5570,7 +5691,7 @@
             </a:r>
             <a:r>
               <a:rPr lang="fi-FI" dirty="0" smtClean="0"/>
-              <a:t> of 3D –</a:t>
+              <a:t> of 3D </a:t>
             </a:r>
             <a:r>
               <a:rPr lang="fi-FI" dirty="0" err="1" smtClean="0"/>
@@ -5578,6 +5699,22 @@
             </a:r>
             <a:r>
               <a:rPr lang="fi-FI" dirty="0" smtClean="0"/>
+              <a:t>. For </a:t>
+            </a:r>
+            <a:r>
+              <a:rPr lang="fi-FI" dirty="0" err="1" smtClean="0"/>
+              <a:t>that</a:t>
+            </a:r>
+            <a:r>
+              <a:rPr lang="fi-FI" dirty="0" smtClean="0"/>
+              <a:t>, </a:t>
+            </a:r>
+            <a:r>
+              <a:rPr lang="fi-FI" dirty="0" err="1" smtClean="0"/>
+              <a:t>the</a:t>
+            </a:r>
+            <a:r>
+              <a:rPr lang="fi-FI" dirty="0" smtClean="0"/>
               <a:t> </a:t>
             </a:r>
             <a:r>
@@ -5634,7 +5771,15 @@
             </a:r>
             <a:r>
               <a:rPr lang="fi-FI" dirty="0" smtClean="0"/>
-              <a:t> is </a:t>
+              <a:t> </a:t>
+            </a:r>
+            <a:r>
+              <a:rPr lang="fi-FI" dirty="0" err="1" smtClean="0"/>
+              <a:t>are</a:t>
+            </a:r>
+            <a:r>
+              <a:rPr lang="fi-FI" dirty="0" smtClean="0"/>
+              <a:t> </a:t>
             </a:r>
             <a:r>
               <a:rPr lang="fi-FI" dirty="0" err="1" smtClean="0"/>
@@ -6082,7 +6227,7 @@
               <a:rPr lang="fi-FI" dirty="0" err="1" smtClean="0"/>
               <a:t>screen</a:t>
             </a:r>
-            <a:endParaRPr lang="fi-FI" smtClean="0"/>
+            <a:endParaRPr lang="fi-FI" dirty="0" smtClean="0"/>
           </a:p>
           <a:p>
             <a:pPr marL="0" marR="0" lvl="0" indent="0" algn="ctr" rtl="0">
@@ -6202,7 +6347,15 @@
             </a:r>
             <a:r>
               <a:rPr lang="fi-FI" dirty="0" smtClean="0"/>
-              <a:t> is </a:t>
+              <a:t> </a:t>
+            </a:r>
+            <a:r>
+              <a:rPr lang="fi-FI" dirty="0" err="1" smtClean="0"/>
+              <a:t>was</a:t>
+            </a:r>
+            <a:r>
+              <a:rPr lang="fi-FI" dirty="0" smtClean="0"/>
+              <a:t> </a:t>
             </a:r>
             <a:r>
               <a:rPr lang="fi-FI" dirty="0" err="1" smtClean="0"/>
@@ -6253,8 +6406,12 @@
               <a:t> </a:t>
             </a:r>
             <a:r>
-              <a:rPr lang="fi-FI" dirty="0" err="1" smtClean="0"/>
-              <a:t>unity</a:t>
+              <a:rPr lang="fi-FI" dirty="0" err="1"/>
+              <a:t>U</a:t>
+            </a:r>
+            <a:r>
+              <a:rPr lang="fi-FI" dirty="0" err="1" smtClean="0"/>
+              <a:t>nity</a:t>
             </a:r>
             <a:r>
               <a:rPr lang="fi-FI" dirty="0" smtClean="0"/>
@@ -6354,7 +6511,11 @@
             </a:r>
             <a:r>
               <a:rPr lang="fi-FI" dirty="0" smtClean="0"/>
-              <a:t> 3D –video </a:t>
+              <a:t> 3D </a:t>
+            </a:r>
+            <a:r>
+              <a:rPr lang="fi-FI" dirty="0" smtClean="0"/>
+              <a:t>video </a:t>
             </a:r>
             <a:r>
               <a:rPr lang="fi-FI" dirty="0" err="1" smtClean="0"/>

</xml_diff>